<commit_message>
updated figure2 and figure 3
</commit_message>
<xml_diff>
--- a/talks/imaging_applied_optics_2016/images/modelAndSetup_figure.pptx
+++ b/talks/imaging_applied_optics_2016/images/modelAndSetup_figure.pptx
@@ -306,7 +306,7 @@
           <a:p>
             <a:fld id="{9D9501FF-ABFD-4A20-9D6D-E502A59752B5}" type="datetimeFigureOut">
               <a:rPr lang="en-US" smtClean="0"/>
-              <a:t>3/4/2016</a:t>
+              <a:t>3/21/2016</a:t>
             </a:fld>
             <a:endParaRPr lang="en-US"/>
           </a:p>
@@ -474,7 +474,7 @@
           <a:p>
             <a:fld id="{9D9501FF-ABFD-4A20-9D6D-E502A59752B5}" type="datetimeFigureOut">
               <a:rPr lang="en-US" smtClean="0"/>
-              <a:t>3/4/2016</a:t>
+              <a:t>3/21/2016</a:t>
             </a:fld>
             <a:endParaRPr lang="en-US"/>
           </a:p>
@@ -652,7 +652,7 @@
           <a:p>
             <a:fld id="{9D9501FF-ABFD-4A20-9D6D-E502A59752B5}" type="datetimeFigureOut">
               <a:rPr lang="en-US" smtClean="0"/>
-              <a:t>3/4/2016</a:t>
+              <a:t>3/21/2016</a:t>
             </a:fld>
             <a:endParaRPr lang="en-US"/>
           </a:p>
@@ -820,7 +820,7 @@
           <a:p>
             <a:fld id="{9D9501FF-ABFD-4A20-9D6D-E502A59752B5}" type="datetimeFigureOut">
               <a:rPr lang="en-US" smtClean="0"/>
-              <a:t>3/4/2016</a:t>
+              <a:t>3/21/2016</a:t>
             </a:fld>
             <a:endParaRPr lang="en-US"/>
           </a:p>
@@ -1065,7 +1065,7 @@
           <a:p>
             <a:fld id="{9D9501FF-ABFD-4A20-9D6D-E502A59752B5}" type="datetimeFigureOut">
               <a:rPr lang="en-US" smtClean="0"/>
-              <a:t>3/4/2016</a:t>
+              <a:t>3/21/2016</a:t>
             </a:fld>
             <a:endParaRPr lang="en-US"/>
           </a:p>
@@ -1294,7 +1294,7 @@
           <a:p>
             <a:fld id="{9D9501FF-ABFD-4A20-9D6D-E502A59752B5}" type="datetimeFigureOut">
               <a:rPr lang="en-US" smtClean="0"/>
-              <a:t>3/4/2016</a:t>
+              <a:t>3/21/2016</a:t>
             </a:fld>
             <a:endParaRPr lang="en-US"/>
           </a:p>
@@ -1658,7 +1658,7 @@
           <a:p>
             <a:fld id="{9D9501FF-ABFD-4A20-9D6D-E502A59752B5}" type="datetimeFigureOut">
               <a:rPr lang="en-US" smtClean="0"/>
-              <a:t>3/4/2016</a:t>
+              <a:t>3/21/2016</a:t>
             </a:fld>
             <a:endParaRPr lang="en-US"/>
           </a:p>
@@ -1775,7 +1775,7 @@
           <a:p>
             <a:fld id="{9D9501FF-ABFD-4A20-9D6D-E502A59752B5}" type="datetimeFigureOut">
               <a:rPr lang="en-US" smtClean="0"/>
-              <a:t>3/4/2016</a:t>
+              <a:t>3/21/2016</a:t>
             </a:fld>
             <a:endParaRPr lang="en-US"/>
           </a:p>
@@ -1870,7 +1870,7 @@
           <a:p>
             <a:fld id="{9D9501FF-ABFD-4A20-9D6D-E502A59752B5}" type="datetimeFigureOut">
               <a:rPr lang="en-US" smtClean="0"/>
-              <a:t>3/4/2016</a:t>
+              <a:t>3/21/2016</a:t>
             </a:fld>
             <a:endParaRPr lang="en-US"/>
           </a:p>
@@ -2145,7 +2145,7 @@
           <a:p>
             <a:fld id="{9D9501FF-ABFD-4A20-9D6D-E502A59752B5}" type="datetimeFigureOut">
               <a:rPr lang="en-US" smtClean="0"/>
-              <a:t>3/4/2016</a:t>
+              <a:t>3/21/2016</a:t>
             </a:fld>
             <a:endParaRPr lang="en-US"/>
           </a:p>
@@ -2400,7 +2400,7 @@
           <a:p>
             <a:fld id="{9D9501FF-ABFD-4A20-9D6D-E502A59752B5}" type="datetimeFigureOut">
               <a:rPr lang="en-US" smtClean="0"/>
-              <a:t>3/4/2016</a:t>
+              <a:t>3/21/2016</a:t>
             </a:fld>
             <a:endParaRPr lang="en-US"/>
           </a:p>
@@ -2611,7 +2611,7 @@
           <a:p>
             <a:fld id="{9D9501FF-ABFD-4A20-9D6D-E502A59752B5}" type="datetimeFigureOut">
               <a:rPr lang="en-US" smtClean="0"/>
-              <a:t>3/4/2016</a:t>
+              <a:t>3/21/2016</a:t>
             </a:fld>
             <a:endParaRPr lang="en-US"/>
           </a:p>
@@ -6591,9 +6591,333 @@
           </p:style>
         </p:cxnSp>
       </p:grpSp>
+      <p:sp>
+        <p:nvSpPr>
+          <p:cNvPr id="74" name="Freeform 73" hidden="1"/>
+          <p:cNvSpPr/>
+          <p:nvPr/>
+        </p:nvSpPr>
+        <p:spPr>
+          <a:xfrm>
+            <a:off x="1102517" y="1657349"/>
+            <a:ext cx="823913" cy="1314450"/>
+          </a:xfrm>
+          <a:custGeom>
+            <a:avLst/>
+            <a:gdLst>
+              <a:gd name="connsiteX0" fmla="*/ 640557 w 823913"/>
+              <a:gd name="connsiteY0" fmla="*/ 0 h 1314450"/>
+              <a:gd name="connsiteX1" fmla="*/ 697707 w 823913"/>
+              <a:gd name="connsiteY1" fmla="*/ 95250 h 1314450"/>
+              <a:gd name="connsiteX2" fmla="*/ 764382 w 823913"/>
+              <a:gd name="connsiteY2" fmla="*/ 214312 h 1314450"/>
+              <a:gd name="connsiteX3" fmla="*/ 804863 w 823913"/>
+              <a:gd name="connsiteY3" fmla="*/ 314325 h 1314450"/>
+              <a:gd name="connsiteX4" fmla="*/ 816769 w 823913"/>
+              <a:gd name="connsiteY4" fmla="*/ 364331 h 1314450"/>
+              <a:gd name="connsiteX5" fmla="*/ 823913 w 823913"/>
+              <a:gd name="connsiteY5" fmla="*/ 423862 h 1314450"/>
+              <a:gd name="connsiteX6" fmla="*/ 807244 w 823913"/>
+              <a:gd name="connsiteY6" fmla="*/ 495300 h 1314450"/>
+              <a:gd name="connsiteX7" fmla="*/ 773907 w 823913"/>
+              <a:gd name="connsiteY7" fmla="*/ 542925 h 1314450"/>
+              <a:gd name="connsiteX8" fmla="*/ 726282 w 823913"/>
+              <a:gd name="connsiteY8" fmla="*/ 578643 h 1314450"/>
+              <a:gd name="connsiteX9" fmla="*/ 652463 w 823913"/>
+              <a:gd name="connsiteY9" fmla="*/ 611981 h 1314450"/>
+              <a:gd name="connsiteX10" fmla="*/ 576263 w 823913"/>
+              <a:gd name="connsiteY10" fmla="*/ 640556 h 1314450"/>
+              <a:gd name="connsiteX11" fmla="*/ 488157 w 823913"/>
+              <a:gd name="connsiteY11" fmla="*/ 666750 h 1314450"/>
+              <a:gd name="connsiteX12" fmla="*/ 445294 w 823913"/>
+              <a:gd name="connsiteY12" fmla="*/ 681037 h 1314450"/>
+              <a:gd name="connsiteX13" fmla="*/ 373857 w 823913"/>
+              <a:gd name="connsiteY13" fmla="*/ 709612 h 1314450"/>
+              <a:gd name="connsiteX14" fmla="*/ 335757 w 823913"/>
+              <a:gd name="connsiteY14" fmla="*/ 728662 h 1314450"/>
+              <a:gd name="connsiteX15" fmla="*/ 292894 w 823913"/>
+              <a:gd name="connsiteY15" fmla="*/ 752475 h 1314450"/>
+              <a:gd name="connsiteX16" fmla="*/ 266700 w 823913"/>
+              <a:gd name="connsiteY16" fmla="*/ 776287 h 1314450"/>
+              <a:gd name="connsiteX17" fmla="*/ 247650 w 823913"/>
+              <a:gd name="connsiteY17" fmla="*/ 795337 h 1314450"/>
+              <a:gd name="connsiteX18" fmla="*/ 214313 w 823913"/>
+              <a:gd name="connsiteY18" fmla="*/ 866775 h 1314450"/>
+              <a:gd name="connsiteX19" fmla="*/ 188119 w 823913"/>
+              <a:gd name="connsiteY19" fmla="*/ 921543 h 1314450"/>
+              <a:gd name="connsiteX20" fmla="*/ 178594 w 823913"/>
+              <a:gd name="connsiteY20" fmla="*/ 976312 h 1314450"/>
+              <a:gd name="connsiteX21" fmla="*/ 171450 w 823913"/>
+              <a:gd name="connsiteY21" fmla="*/ 1059656 h 1314450"/>
+              <a:gd name="connsiteX22" fmla="*/ 176213 w 823913"/>
+              <a:gd name="connsiteY22" fmla="*/ 1119187 h 1314450"/>
+              <a:gd name="connsiteX23" fmla="*/ 178594 w 823913"/>
+              <a:gd name="connsiteY23" fmla="*/ 1173956 h 1314450"/>
+              <a:gd name="connsiteX24" fmla="*/ 188119 w 823913"/>
+              <a:gd name="connsiteY24" fmla="*/ 1240631 h 1314450"/>
+              <a:gd name="connsiteX25" fmla="*/ 195263 w 823913"/>
+              <a:gd name="connsiteY25" fmla="*/ 1295400 h 1314450"/>
+              <a:gd name="connsiteX26" fmla="*/ 197644 w 823913"/>
+              <a:gd name="connsiteY26" fmla="*/ 1314450 h 1314450"/>
+              <a:gd name="connsiteX27" fmla="*/ 0 w 823913"/>
+              <a:gd name="connsiteY27" fmla="*/ 1312068 h 1314450"/>
+              <a:gd name="connsiteX28" fmla="*/ 185738 w 823913"/>
+              <a:gd name="connsiteY28" fmla="*/ 921543 h 1314450"/>
+              <a:gd name="connsiteX29" fmla="*/ 640557 w 823913"/>
+              <a:gd name="connsiteY29" fmla="*/ 0 h 1314450"/>
+            </a:gdLst>
+            <a:ahLst/>
+            <a:cxnLst>
+              <a:cxn ang="0">
+                <a:pos x="connsiteX0" y="connsiteY0"/>
+              </a:cxn>
+              <a:cxn ang="0">
+                <a:pos x="connsiteX1" y="connsiteY1"/>
+              </a:cxn>
+              <a:cxn ang="0">
+                <a:pos x="connsiteX2" y="connsiteY2"/>
+              </a:cxn>
+              <a:cxn ang="0">
+                <a:pos x="connsiteX3" y="connsiteY3"/>
+              </a:cxn>
+              <a:cxn ang="0">
+                <a:pos x="connsiteX4" y="connsiteY4"/>
+              </a:cxn>
+              <a:cxn ang="0">
+                <a:pos x="connsiteX5" y="connsiteY5"/>
+              </a:cxn>
+              <a:cxn ang="0">
+                <a:pos x="connsiteX6" y="connsiteY6"/>
+              </a:cxn>
+              <a:cxn ang="0">
+                <a:pos x="connsiteX7" y="connsiteY7"/>
+              </a:cxn>
+              <a:cxn ang="0">
+                <a:pos x="connsiteX8" y="connsiteY8"/>
+              </a:cxn>
+              <a:cxn ang="0">
+                <a:pos x="connsiteX9" y="connsiteY9"/>
+              </a:cxn>
+              <a:cxn ang="0">
+                <a:pos x="connsiteX10" y="connsiteY10"/>
+              </a:cxn>
+              <a:cxn ang="0">
+                <a:pos x="connsiteX11" y="connsiteY11"/>
+              </a:cxn>
+              <a:cxn ang="0">
+                <a:pos x="connsiteX12" y="connsiteY12"/>
+              </a:cxn>
+              <a:cxn ang="0">
+                <a:pos x="connsiteX13" y="connsiteY13"/>
+              </a:cxn>
+              <a:cxn ang="0">
+                <a:pos x="connsiteX14" y="connsiteY14"/>
+              </a:cxn>
+              <a:cxn ang="0">
+                <a:pos x="connsiteX15" y="connsiteY15"/>
+              </a:cxn>
+              <a:cxn ang="0">
+                <a:pos x="connsiteX16" y="connsiteY16"/>
+              </a:cxn>
+              <a:cxn ang="0">
+                <a:pos x="connsiteX17" y="connsiteY17"/>
+              </a:cxn>
+              <a:cxn ang="0">
+                <a:pos x="connsiteX18" y="connsiteY18"/>
+              </a:cxn>
+              <a:cxn ang="0">
+                <a:pos x="connsiteX19" y="connsiteY19"/>
+              </a:cxn>
+              <a:cxn ang="0">
+                <a:pos x="connsiteX20" y="connsiteY20"/>
+              </a:cxn>
+              <a:cxn ang="0">
+                <a:pos x="connsiteX21" y="connsiteY21"/>
+              </a:cxn>
+              <a:cxn ang="0">
+                <a:pos x="connsiteX22" y="connsiteY22"/>
+              </a:cxn>
+              <a:cxn ang="0">
+                <a:pos x="connsiteX23" y="connsiteY23"/>
+              </a:cxn>
+              <a:cxn ang="0">
+                <a:pos x="connsiteX24" y="connsiteY24"/>
+              </a:cxn>
+              <a:cxn ang="0">
+                <a:pos x="connsiteX25" y="connsiteY25"/>
+              </a:cxn>
+              <a:cxn ang="0">
+                <a:pos x="connsiteX26" y="connsiteY26"/>
+              </a:cxn>
+              <a:cxn ang="0">
+                <a:pos x="connsiteX27" y="connsiteY27"/>
+              </a:cxn>
+              <a:cxn ang="0">
+                <a:pos x="connsiteX28" y="connsiteY28"/>
+              </a:cxn>
+              <a:cxn ang="0">
+                <a:pos x="connsiteX29" y="connsiteY29"/>
+              </a:cxn>
+            </a:cxnLst>
+            <a:rect l="l" t="t" r="r" b="b"/>
+            <a:pathLst>
+              <a:path w="823913" h="1314450">
+                <a:moveTo>
+                  <a:pt x="640557" y="0"/>
+                </a:moveTo>
+                <a:lnTo>
+                  <a:pt x="697707" y="95250"/>
+                </a:lnTo>
+                <a:lnTo>
+                  <a:pt x="764382" y="214312"/>
+                </a:lnTo>
+                <a:lnTo>
+                  <a:pt x="804863" y="314325"/>
+                </a:lnTo>
+                <a:lnTo>
+                  <a:pt x="816769" y="364331"/>
+                </a:lnTo>
+                <a:lnTo>
+                  <a:pt x="823913" y="423862"/>
+                </a:lnTo>
+                <a:lnTo>
+                  <a:pt x="807244" y="495300"/>
+                </a:lnTo>
+                <a:lnTo>
+                  <a:pt x="773907" y="542925"/>
+                </a:lnTo>
+                <a:lnTo>
+                  <a:pt x="726282" y="578643"/>
+                </a:lnTo>
+                <a:lnTo>
+                  <a:pt x="652463" y="611981"/>
+                </a:lnTo>
+                <a:lnTo>
+                  <a:pt x="576263" y="640556"/>
+                </a:lnTo>
+                <a:lnTo>
+                  <a:pt x="488157" y="666750"/>
+                </a:lnTo>
+                <a:lnTo>
+                  <a:pt x="445294" y="681037"/>
+                </a:lnTo>
+                <a:lnTo>
+                  <a:pt x="373857" y="709612"/>
+                </a:lnTo>
+                <a:lnTo>
+                  <a:pt x="335757" y="728662"/>
+                </a:lnTo>
+                <a:lnTo>
+                  <a:pt x="292894" y="752475"/>
+                </a:lnTo>
+                <a:lnTo>
+                  <a:pt x="266700" y="776287"/>
+                </a:lnTo>
+                <a:lnTo>
+                  <a:pt x="247650" y="795337"/>
+                </a:lnTo>
+                <a:lnTo>
+                  <a:pt x="214313" y="866775"/>
+                </a:lnTo>
+                <a:lnTo>
+                  <a:pt x="188119" y="921543"/>
+                </a:lnTo>
+                <a:lnTo>
+                  <a:pt x="178594" y="976312"/>
+                </a:lnTo>
+                <a:lnTo>
+                  <a:pt x="171450" y="1059656"/>
+                </a:lnTo>
+                <a:lnTo>
+                  <a:pt x="176213" y="1119187"/>
+                </a:lnTo>
+                <a:cubicBezTo>
+                  <a:pt x="177007" y="1137443"/>
+                  <a:pt x="177800" y="1155700"/>
+                  <a:pt x="178594" y="1173956"/>
+                </a:cubicBezTo>
+                <a:lnTo>
+                  <a:pt x="188119" y="1240631"/>
+                </a:lnTo>
+                <a:lnTo>
+                  <a:pt x="195263" y="1295400"/>
+                </a:lnTo>
+                <a:lnTo>
+                  <a:pt x="197644" y="1314450"/>
+                </a:lnTo>
+                <a:lnTo>
+                  <a:pt x="0" y="1312068"/>
+                </a:lnTo>
+                <a:lnTo>
+                  <a:pt x="185738" y="921543"/>
+                </a:lnTo>
+                <a:lnTo>
+                  <a:pt x="640557" y="0"/>
+                </a:lnTo>
+                <a:close/>
+              </a:path>
+            </a:pathLst>
+          </a:custGeom>
+          <a:gradFill>
+            <a:gsLst>
+              <a:gs pos="0">
+                <a:schemeClr val="accent1">
+                  <a:lumMod val="5000"/>
+                  <a:lumOff val="95000"/>
+                  <a:alpha val="43000"/>
+                </a:schemeClr>
+              </a:gs>
+              <a:gs pos="67000">
+                <a:schemeClr val="bg2">
+                  <a:lumMod val="50000"/>
+                  <a:alpha val="71000"/>
+                </a:schemeClr>
+              </a:gs>
+              <a:gs pos="100000">
+                <a:schemeClr val="tx1">
+                  <a:lumMod val="65000"/>
+                  <a:lumOff val="35000"/>
+                  <a:alpha val="78000"/>
+                </a:schemeClr>
+              </a:gs>
+            </a:gsLst>
+            <a:lin ang="1800000" scaled="0"/>
+          </a:gradFill>
+          <a:ln>
+            <a:noFill/>
+          </a:ln>
+          <a:effectLst>
+            <a:softEdge rad="76200"/>
+          </a:effectLst>
+        </p:spPr>
+        <p:style>
+          <a:lnRef idx="2">
+            <a:schemeClr val="accent1">
+              <a:shade val="50000"/>
+            </a:schemeClr>
+          </a:lnRef>
+          <a:fillRef idx="1">
+            <a:schemeClr val="accent1"/>
+          </a:fillRef>
+          <a:effectRef idx="0">
+            <a:schemeClr val="accent1"/>
+          </a:effectRef>
+          <a:fontRef idx="minor">
+            <a:schemeClr val="lt1"/>
+          </a:fontRef>
+        </p:style>
+        <p:txBody>
+          <a:bodyPr rtlCol="0" anchor="ctr"/>
+          <a:lstStyle/>
+          <a:p>
+            <a:pPr algn="ctr"/>
+            <a:endParaRPr lang="en-US"/>
+          </a:p>
+        </p:txBody>
+      </p:sp>
       <p:grpSp>
         <p:nvGrpSpPr>
-          <p:cNvPr id="148" name="Group 147"/>
+          <p:cNvPr id="76" name="Group 75"/>
           <p:cNvGrpSpPr/>
           <p:nvPr/>
         </p:nvGrpSpPr>
@@ -7635,8 +7959,8 @@
             </a:fontRef>
           </p:style>
         </p:cxnSp>
-        <mc:AlternateContent xmlns:mc="http://schemas.openxmlformats.org/markup-compatibility/2006" xmlns:a14="http://schemas.microsoft.com/office/drawing/2010/main">
-          <mc:Choice Requires="a14">
+        <mc:AlternateContent xmlns:mc="http://schemas.openxmlformats.org/markup-compatibility/2006">
+          <mc:Choice xmlns:a14="http://schemas.microsoft.com/office/drawing/2010/main" Requires="a14">
             <p:sp>
               <p:nvSpPr>
                 <p:cNvPr id="24" name="z prime"/>
@@ -7692,7 +8016,7 @@
               </p:txBody>
             </p:sp>
           </mc:Choice>
-          <mc:Fallback xmlns="">
+          <mc:Fallback>
             <p:sp>
               <p:nvSpPr>
                 <p:cNvPr id="24" name="z prime"/>
@@ -7731,8 +8055,8 @@
             </p:sp>
           </mc:Fallback>
         </mc:AlternateContent>
-        <mc:AlternateContent xmlns:mc="http://schemas.openxmlformats.org/markup-compatibility/2006" xmlns:a14="http://schemas.microsoft.com/office/drawing/2010/main">
-          <mc:Choice Requires="a14">
+        <mc:AlternateContent xmlns:mc="http://schemas.openxmlformats.org/markup-compatibility/2006">
+          <mc:Choice xmlns:a14="http://schemas.microsoft.com/office/drawing/2010/main" Requires="a14">
             <p:sp>
               <p:nvSpPr>
                 <p:cNvPr id="25" name="TextBox NormalToImagePlane"/>
@@ -7823,7 +8147,7 @@
               </p:txBody>
             </p:sp>
           </mc:Choice>
-          <mc:Fallback xmlns="">
+          <mc:Fallback>
             <p:sp>
               <p:nvSpPr>
                 <p:cNvPr id="25" name="TextBox NormalToImagePlane"/>
@@ -8071,8 +8395,8 @@
             </a:fontRef>
           </p:style>
         </p:cxnSp>
-        <mc:AlternateContent xmlns:mc="http://schemas.openxmlformats.org/markup-compatibility/2006" xmlns:a14="http://schemas.microsoft.com/office/drawing/2010/main">
-          <mc:Choice Requires="a14">
+        <mc:AlternateContent xmlns:mc="http://schemas.openxmlformats.org/markup-compatibility/2006">
+          <mc:Choice xmlns:a14="http://schemas.microsoft.com/office/drawing/2010/main" Requires="a14">
             <p:sp>
               <p:nvSpPr>
                 <p:cNvPr id="31" name="Text Box 15"/>
@@ -8156,7 +8480,7 @@
               </p:txBody>
             </p:sp>
           </mc:Choice>
-          <mc:Fallback xmlns="">
+          <mc:Fallback>
             <p:sp>
               <p:nvSpPr>
                 <p:cNvPr id="31" name="Text Box 15"/>
@@ -8199,8 +8523,8 @@
             </p:sp>
           </mc:Fallback>
         </mc:AlternateContent>
-        <mc:AlternateContent xmlns:mc="http://schemas.openxmlformats.org/markup-compatibility/2006" xmlns:a14="http://schemas.microsoft.com/office/drawing/2010/main">
-          <mc:Choice Requires="a14">
+        <mc:AlternateContent xmlns:mc="http://schemas.openxmlformats.org/markup-compatibility/2006">
+          <mc:Choice xmlns:a14="http://schemas.microsoft.com/office/drawing/2010/main" Requires="a14">
             <p:sp>
               <p:nvSpPr>
                 <p:cNvPr id="32" name="Text Box 15"/>
@@ -8299,7 +8623,7 @@
               </p:txBody>
             </p:sp>
           </mc:Choice>
-          <mc:Fallback xmlns="">
+          <mc:Fallback>
             <p:sp>
               <p:nvSpPr>
                 <p:cNvPr id="32" name="Text Box 15"/>
@@ -8441,8 +8765,8 @@
             </a:p>
           </p:txBody>
         </p:sp>
-        <mc:AlternateContent xmlns:mc="http://schemas.openxmlformats.org/markup-compatibility/2006" xmlns:a14="http://schemas.microsoft.com/office/drawing/2010/main">
-          <mc:Choice Requires="a14">
+        <mc:AlternateContent xmlns:mc="http://schemas.openxmlformats.org/markup-compatibility/2006">
+          <mc:Choice xmlns:a14="http://schemas.microsoft.com/office/drawing/2010/main" Requires="a14">
             <p:sp>
               <p:nvSpPr>
                 <p:cNvPr id="41" name="TextBox 40"/>
@@ -8601,7 +8925,7 @@
               </p:txBody>
             </p:sp>
           </mc:Choice>
-          <mc:Fallback xmlns="">
+          <mc:Fallback>
             <p:sp>
               <p:nvSpPr>
                 <p:cNvPr id="41" name="TextBox 40"/>
@@ -9001,8 +9325,8 @@
             </a:p>
           </p:txBody>
         </p:sp>
-        <mc:AlternateContent xmlns:mc="http://schemas.openxmlformats.org/markup-compatibility/2006" xmlns:a14="http://schemas.microsoft.com/office/drawing/2010/main">
-          <mc:Choice Requires="a14">
+        <mc:AlternateContent xmlns:mc="http://schemas.openxmlformats.org/markup-compatibility/2006">
+          <mc:Choice xmlns:a14="http://schemas.microsoft.com/office/drawing/2010/main" Requires="a14">
             <p:sp>
               <p:nvSpPr>
                 <p:cNvPr id="50" name="TextBox 49"/>
@@ -9218,7 +9542,7 @@
               </p:txBody>
             </p:sp>
           </mc:Choice>
-          <mc:Fallback xmlns="">
+          <mc:Fallback>
             <p:sp>
               <p:nvSpPr>
                 <p:cNvPr id="50" name="TextBox 49"/>
@@ -9358,8 +9682,8 @@
             </p:style>
           </p:cxnSp>
         </p:grpSp>
-        <mc:AlternateContent xmlns:mc="http://schemas.openxmlformats.org/markup-compatibility/2006" xmlns:a14="http://schemas.microsoft.com/office/drawing/2010/main">
-          <mc:Choice Requires="a14">
+        <mc:AlternateContent xmlns:mc="http://schemas.openxmlformats.org/markup-compatibility/2006">
+          <mc:Choice xmlns:a14="http://schemas.microsoft.com/office/drawing/2010/main" Requires="a14">
             <p:sp>
               <p:nvSpPr>
                 <p:cNvPr id="52" name="TextBox 51"/>
@@ -9425,7 +9749,7 @@
               </p:txBody>
             </p:sp>
           </mc:Choice>
-          <mc:Fallback xmlns="">
+          <mc:Fallback>
             <p:sp>
               <p:nvSpPr>
                 <p:cNvPr id="52" name="TextBox 51"/>
@@ -9464,8 +9788,8 @@
             </p:sp>
           </mc:Fallback>
         </mc:AlternateContent>
-        <mc:AlternateContent xmlns:mc="http://schemas.openxmlformats.org/markup-compatibility/2006" xmlns:a14="http://schemas.microsoft.com/office/drawing/2010/main">
-          <mc:Choice Requires="a14">
+        <mc:AlternateContent xmlns:mc="http://schemas.openxmlformats.org/markup-compatibility/2006">
+          <mc:Choice xmlns:a14="http://schemas.microsoft.com/office/drawing/2010/main" Requires="a14">
             <p:sp>
               <p:nvSpPr>
                 <p:cNvPr id="53" name="TextBox 52"/>
@@ -9551,7 +9875,7 @@
               </p:txBody>
             </p:sp>
           </mc:Choice>
-          <mc:Fallback xmlns="">
+          <mc:Fallback>
             <p:sp>
               <p:nvSpPr>
                 <p:cNvPr id="53" name="TextBox 52"/>
@@ -9590,8 +9914,8 @@
             </p:sp>
           </mc:Fallback>
         </mc:AlternateContent>
-        <mc:AlternateContent xmlns:mc="http://schemas.openxmlformats.org/markup-compatibility/2006" xmlns:a14="http://schemas.microsoft.com/office/drawing/2010/main">
-          <mc:Choice Requires="a14">
+        <mc:AlternateContent xmlns:mc="http://schemas.openxmlformats.org/markup-compatibility/2006">
+          <mc:Choice xmlns:a14="http://schemas.microsoft.com/office/drawing/2010/main" Requires="a14">
             <p:sp>
               <p:nvSpPr>
                 <p:cNvPr id="54" name="TextBox - z_o prime"/>
@@ -9674,7 +9998,7 @@
               </p:txBody>
             </p:sp>
           </mc:Choice>
-          <mc:Fallback xmlns="">
+          <mc:Fallback>
             <p:sp>
               <p:nvSpPr>
                 <p:cNvPr id="54" name="TextBox - z_o prime"/>
@@ -10843,8 +11167,8 @@
             </a:fontRef>
           </p:style>
         </p:cxnSp>
-        <mc:AlternateContent xmlns:mc="http://schemas.openxmlformats.org/markup-compatibility/2006" xmlns:a14="http://schemas.microsoft.com/office/drawing/2010/main">
-          <mc:Choice Requires="a14">
+        <mc:AlternateContent xmlns:mc="http://schemas.openxmlformats.org/markup-compatibility/2006">
+          <mc:Choice xmlns:a14="http://schemas.microsoft.com/office/drawing/2010/main" Requires="a14">
             <p:sp>
               <p:nvSpPr>
                 <p:cNvPr id="64" name="TextBox 63"/>
@@ -10891,7 +11215,7 @@
               </p:txBody>
             </p:sp>
           </mc:Choice>
-          <mc:Fallback xmlns="">
+          <mc:Fallback>
             <p:sp>
               <p:nvSpPr>
                 <p:cNvPr id="64" name="TextBox 63"/>
@@ -11724,8 +12048,8 @@
             </p:txBody>
           </p:sp>
         </p:grpSp>
-        <mc:AlternateContent xmlns:mc="http://schemas.openxmlformats.org/markup-compatibility/2006" xmlns:a14="http://schemas.microsoft.com/office/drawing/2010/main">
-          <mc:Choice Requires="a14">
+        <mc:AlternateContent xmlns:mc="http://schemas.openxmlformats.org/markup-compatibility/2006">
+          <mc:Choice xmlns:a14="http://schemas.microsoft.com/office/drawing/2010/main" Requires="a14">
             <p:sp>
               <p:nvSpPr>
                 <p:cNvPr id="78" name="ImagePlaneFrameCenter"/>
@@ -11792,7 +12116,7 @@
               </p:txBody>
             </p:sp>
           </mc:Choice>
-          <mc:Fallback xmlns="">
+          <mc:Fallback>
             <p:sp>
               <p:nvSpPr>
                 <p:cNvPr id="78" name="ImagePlaneFrameCenter"/>
@@ -11839,8 +12163,8 @@
           </p:nvSpPr>
           <p:spPr>
             <a:xfrm>
-              <a:off x="1514307" y="2294315"/>
-              <a:ext cx="445956" cy="230832"/>
+              <a:off x="1523833" y="2280026"/>
+              <a:ext cx="474810" cy="246221"/>
             </a:xfrm>
             <a:prstGeom prst="rect">
               <a:avLst/>
@@ -11854,7 +12178,7 @@
             <a:lstStyle/>
             <a:p>
               <a:r>
-                <a:rPr lang="en-US" sz="900" i="1" dirty="0">
+                <a:rPr lang="en-US" sz="1000" i="1" dirty="0">
                   <a:solidFill>
                     <a:schemeClr val="tx1">
                       <a:lumMod val="75000"/>
@@ -11863,6 +12187,175 @@
                   </a:solidFill>
                 </a:rPr>
                 <a:t>z-axis</a:t>
+              </a:r>
+            </a:p>
+          </p:txBody>
+        </p:sp>
+        <p:sp>
+          <p:nvSpPr>
+            <p:cNvPr id="4" name="Freeform 3"/>
+            <p:cNvSpPr/>
+            <p:nvPr/>
+          </p:nvSpPr>
+          <p:spPr>
+            <a:xfrm rot="1061515">
+              <a:off x="1374978" y="1649340"/>
+              <a:ext cx="464482" cy="1384418"/>
+            </a:xfrm>
+            <a:custGeom>
+              <a:avLst/>
+              <a:gdLst>
+                <a:gd name="connsiteX0" fmla="*/ 154719 w 464482"/>
+                <a:gd name="connsiteY0" fmla="*/ 0 h 1384418"/>
+                <a:gd name="connsiteX1" fmla="*/ 462367 w 464482"/>
+                <a:gd name="connsiteY1" fmla="*/ 435835 h 1384418"/>
+                <a:gd name="connsiteX2" fmla="*/ 17986 w 464482"/>
+                <a:gd name="connsiteY2" fmla="*/ 880217 h 1384418"/>
+                <a:gd name="connsiteX3" fmla="*/ 129081 w 464482"/>
+                <a:gd name="connsiteY3" fmla="*/ 1384418 h 1384418"/>
+              </a:gdLst>
+              <a:ahLst/>
+              <a:cxnLst>
+                <a:cxn ang="0">
+                  <a:pos x="connsiteX0" y="connsiteY0"/>
+                </a:cxn>
+                <a:cxn ang="0">
+                  <a:pos x="connsiteX1" y="connsiteY1"/>
+                </a:cxn>
+                <a:cxn ang="0">
+                  <a:pos x="connsiteX2" y="connsiteY2"/>
+                </a:cxn>
+                <a:cxn ang="0">
+                  <a:pos x="connsiteX3" y="connsiteY3"/>
+                </a:cxn>
+              </a:cxnLst>
+              <a:rect l="l" t="t" r="r" b="b"/>
+              <a:pathLst>
+                <a:path w="464482" h="1384418">
+                  <a:moveTo>
+                    <a:pt x="154719" y="0"/>
+                  </a:moveTo>
+                  <a:cubicBezTo>
+                    <a:pt x="319937" y="144566"/>
+                    <a:pt x="485156" y="289132"/>
+                    <a:pt x="462367" y="435835"/>
+                  </a:cubicBezTo>
+                  <a:cubicBezTo>
+                    <a:pt x="439578" y="582538"/>
+                    <a:pt x="73534" y="722120"/>
+                    <a:pt x="17986" y="880217"/>
+                  </a:cubicBezTo>
+                  <a:cubicBezTo>
+                    <a:pt x="-37562" y="1038314"/>
+                    <a:pt x="45759" y="1211366"/>
+                    <a:pt x="129081" y="1384418"/>
+                  </a:cubicBezTo>
+                </a:path>
+              </a:pathLst>
+            </a:custGeom>
+            <a:noFill/>
+            <a:ln w="9525">
+              <a:solidFill>
+                <a:schemeClr val="bg2">
+                  <a:lumMod val="50000"/>
+                  <a:alpha val="55000"/>
+                </a:schemeClr>
+              </a:solidFill>
+            </a:ln>
+          </p:spPr>
+          <p:style>
+            <a:lnRef idx="2">
+              <a:schemeClr val="accent1">
+                <a:shade val="50000"/>
+              </a:schemeClr>
+            </a:lnRef>
+            <a:fillRef idx="1">
+              <a:schemeClr val="accent1"/>
+            </a:fillRef>
+            <a:effectRef idx="0">
+              <a:schemeClr val="accent1"/>
+            </a:effectRef>
+            <a:fontRef idx="minor">
+              <a:schemeClr val="lt1"/>
+            </a:fontRef>
+          </p:style>
+          <p:txBody>
+            <a:bodyPr rtlCol="0" anchor="ctr"/>
+            <a:lstStyle/>
+            <a:p>
+              <a:pPr algn="ctr"/>
+              <a:endParaRPr lang="en-US"/>
+            </a:p>
+          </p:txBody>
+        </p:sp>
+        <p:sp>
+          <p:nvSpPr>
+            <p:cNvPr id="134" name="TextBox 133"/>
+            <p:cNvSpPr txBox="1"/>
+            <p:nvPr/>
+          </p:nvSpPr>
+          <p:spPr>
+            <a:xfrm rot="16080000">
+              <a:off x="3636793" y="2905502"/>
+              <a:ext cx="928459" cy="246221"/>
+            </a:xfrm>
+            <a:prstGeom prst="rect">
+              <a:avLst/>
+            </a:prstGeom>
+            <a:noFill/>
+          </p:spPr>
+          <p:txBody>
+            <a:bodyPr wrap="none" rtlCol="0">
+              <a:spAutoFit/>
+            </a:bodyPr>
+            <a:lstStyle/>
+            <a:p>
+              <a:r>
+                <a:rPr lang="en-US" sz="1000" i="1" dirty="0">
+                  <a:solidFill>
+                    <a:schemeClr val="tx1">
+                      <a:lumMod val="50000"/>
+                      <a:lumOff val="50000"/>
+                    </a:schemeClr>
+                  </a:solidFill>
+                </a:rPr>
+                <a:t>Entrance pupil</a:t>
+              </a:r>
+            </a:p>
+          </p:txBody>
+        </p:sp>
+        <p:sp>
+          <p:nvSpPr>
+            <p:cNvPr id="135" name="TextBox 134"/>
+            <p:cNvSpPr txBox="1"/>
+            <p:nvPr/>
+          </p:nvSpPr>
+          <p:spPr>
+            <a:xfrm rot="16080000">
+              <a:off x="5017924" y="1918078"/>
+              <a:ext cx="659155" cy="246221"/>
+            </a:xfrm>
+            <a:prstGeom prst="rect">
+              <a:avLst/>
+            </a:prstGeom>
+            <a:noFill/>
+          </p:spPr>
+          <p:txBody>
+            <a:bodyPr wrap="none" rtlCol="0">
+              <a:spAutoFit/>
+            </a:bodyPr>
+            <a:lstStyle/>
+            <a:p>
+              <a:r>
+                <a:rPr lang="en-US" sz="1000" i="1" dirty="0">
+                  <a:solidFill>
+                    <a:schemeClr val="tx1">
+                      <a:lumMod val="50000"/>
+                      <a:lumOff val="50000"/>
+                    </a:schemeClr>
+                  </a:solidFill>
+                </a:rPr>
+                <a:t>Exit pupil</a:t>
               </a:r>
             </a:p>
           </p:txBody>

</xml_diff>